<commit_message>
Change vertical slide layout
</commit_message>
<xml_diff>
--- a/CI5_registry_graph/slide_template/shiny_template.pptx
+++ b/CI5_registry_graph/slide_template/shiny_template.pptx
@@ -189,7 +189,7 @@
           <a:p>
             <a:fld id="{A4AD94E8-677F-46BE-B971-4F17EE98DD08}" type="datetimeFigureOut">
               <a:rPr lang="en-US" smtClean="0"/>
-              <a:t>12/14/2017</a:t>
+              <a:t>1/22/2018</a:t>
             </a:fld>
             <a:endParaRPr lang="en-US"/>
           </a:p>
@@ -730,7 +730,7 @@
           </a:bodyPr>
           <a:lstStyle>
             <a:lvl1pPr>
-              <a:defRPr sz="3500"/>
+              <a:defRPr sz="2800"/>
             </a:lvl1pPr>
           </a:lstStyle>
           <a:p>

</xml_diff>